<commit_message>
quick image update for docs
</commit_message>
<xml_diff>
--- a/resources/graphics.pptx
+++ b/resources/graphics.pptx
@@ -200,7 +200,7 @@
             <a:fld id="{3D198B4A-6CEA-4635-A00A-E19E57BBFDB9}" type="datetimeFigureOut">
               <a:rPr lang="en-US" smtClean="0"/>
               <a:pPr/>
-              <a:t>5/24/2016</a:t>
+              <a:t>5/30/2016</a:t>
             </a:fld>
             <a:endParaRPr lang="en-US"/>
           </a:p>
@@ -812,7 +812,7 @@
             <a:fld id="{44226C23-AE07-4433-9B3A-8CE06417A35D}" type="datetimeFigureOut">
               <a:rPr lang="en-US" smtClean="0"/>
               <a:pPr/>
-              <a:t>5/24/2016</a:t>
+              <a:t>5/30/2016</a:t>
             </a:fld>
             <a:endParaRPr lang="en-US"/>
           </a:p>
@@ -979,7 +979,7 @@
             <a:fld id="{44226C23-AE07-4433-9B3A-8CE06417A35D}" type="datetimeFigureOut">
               <a:rPr lang="en-US" smtClean="0"/>
               <a:pPr/>
-              <a:t>5/24/2016</a:t>
+              <a:t>5/30/2016</a:t>
             </a:fld>
             <a:endParaRPr lang="en-US"/>
           </a:p>
@@ -1156,7 +1156,7 @@
             <a:fld id="{44226C23-AE07-4433-9B3A-8CE06417A35D}" type="datetimeFigureOut">
               <a:rPr lang="en-US" smtClean="0"/>
               <a:pPr/>
-              <a:t>5/24/2016</a:t>
+              <a:t>5/30/2016</a:t>
             </a:fld>
             <a:endParaRPr lang="en-US"/>
           </a:p>
@@ -1323,7 +1323,7 @@
             <a:fld id="{44226C23-AE07-4433-9B3A-8CE06417A35D}" type="datetimeFigureOut">
               <a:rPr lang="en-US" smtClean="0"/>
               <a:pPr/>
-              <a:t>5/24/2016</a:t>
+              <a:t>5/30/2016</a:t>
             </a:fld>
             <a:endParaRPr lang="en-US"/>
           </a:p>
@@ -1566,7 +1566,7 @@
             <a:fld id="{44226C23-AE07-4433-9B3A-8CE06417A35D}" type="datetimeFigureOut">
               <a:rPr lang="en-US" smtClean="0"/>
               <a:pPr/>
-              <a:t>5/24/2016</a:t>
+              <a:t>5/30/2016</a:t>
             </a:fld>
             <a:endParaRPr lang="en-US"/>
           </a:p>
@@ -1851,7 +1851,7 @@
             <a:fld id="{44226C23-AE07-4433-9B3A-8CE06417A35D}" type="datetimeFigureOut">
               <a:rPr lang="en-US" smtClean="0"/>
               <a:pPr/>
-              <a:t>5/24/2016</a:t>
+              <a:t>5/30/2016</a:t>
             </a:fld>
             <a:endParaRPr lang="en-US"/>
           </a:p>
@@ -2270,7 +2270,7 @@
             <a:fld id="{44226C23-AE07-4433-9B3A-8CE06417A35D}" type="datetimeFigureOut">
               <a:rPr lang="en-US" smtClean="0"/>
               <a:pPr/>
-              <a:t>5/24/2016</a:t>
+              <a:t>5/30/2016</a:t>
             </a:fld>
             <a:endParaRPr lang="en-US"/>
           </a:p>
@@ -2385,7 +2385,7 @@
             <a:fld id="{44226C23-AE07-4433-9B3A-8CE06417A35D}" type="datetimeFigureOut">
               <a:rPr lang="en-US" smtClean="0"/>
               <a:pPr/>
-              <a:t>5/24/2016</a:t>
+              <a:t>5/30/2016</a:t>
             </a:fld>
             <a:endParaRPr lang="en-US"/>
           </a:p>
@@ -2477,7 +2477,7 @@
             <a:fld id="{44226C23-AE07-4433-9B3A-8CE06417A35D}" type="datetimeFigureOut">
               <a:rPr lang="en-US" smtClean="0"/>
               <a:pPr/>
-              <a:t>5/24/2016</a:t>
+              <a:t>5/30/2016</a:t>
             </a:fld>
             <a:endParaRPr lang="en-US"/>
           </a:p>
@@ -2751,7 +2751,7 @@
             <a:fld id="{44226C23-AE07-4433-9B3A-8CE06417A35D}" type="datetimeFigureOut">
               <a:rPr lang="en-US" smtClean="0"/>
               <a:pPr/>
-              <a:t>5/24/2016</a:t>
+              <a:t>5/30/2016</a:t>
             </a:fld>
             <a:endParaRPr lang="en-US"/>
           </a:p>
@@ -3001,7 +3001,7 @@
             <a:fld id="{44226C23-AE07-4433-9B3A-8CE06417A35D}" type="datetimeFigureOut">
               <a:rPr lang="en-US" smtClean="0"/>
               <a:pPr/>
-              <a:t>5/24/2016</a:t>
+              <a:t>5/30/2016</a:t>
             </a:fld>
             <a:endParaRPr lang="en-US"/>
           </a:p>
@@ -3211,7 +3211,7 @@
             <a:fld id="{44226C23-AE07-4433-9B3A-8CE06417A35D}" type="datetimeFigureOut">
               <a:rPr lang="en-US" smtClean="0"/>
               <a:pPr/>
-              <a:t>5/24/2016</a:t>
+              <a:t>5/30/2016</a:t>
             </a:fld>
             <a:endParaRPr lang="en-US"/>
           </a:p>
@@ -5267,7 +5267,9 @@
           </a:solidFill>
           <a:ln>
             <a:solidFill>
-              <a:srgbClr val="FFFF66"/>
+              <a:schemeClr val="bg2">
+                <a:lumMod val="75000"/>
+              </a:schemeClr>
             </a:solidFill>
           </a:ln>
         </p:spPr>

</xml_diff>